<commit_message>
Updates for session 56
</commit_message>
<xml_diff>
--- a/Source/Cooking With CQL/56/Clinical Reasoning 28 Track Preview.pptx
+++ b/Source/Cooking With CQL/56/Clinical Reasoning 28 Track Preview.pptx
@@ -251,7 +251,7 @@
       <p15:sldGuideLst xmlns:p15="http://schemas.microsoft.com/office/powerpoint/2012/main"/>
     </p:ext>
     <p:ext uri="http://customooxmlschemas.google.com/">
-      <go:slidesCustomData xmlns="" xmlns:mc="http://schemas.openxmlformats.org/markup-compatibility/2006" xmlns:mv="urn:schemas-microsoft-com:mac:vml" xmlns:c="http://schemas.openxmlformats.org/drawingml/2006/chart" xmlns:dgm="http://schemas.openxmlformats.org/drawingml/2006/diagram" xmlns:o="urn:schemas-microsoft-com:office:office" xmlns:v="urn:schemas-microsoft-com:vml" xmlns:pvml="urn:schemas-microsoft-com:office:powerpoint" xmlns:com="http://schemas.openxmlformats.org/drawingml/2006/compatibility" xmlns:p14="http://schemas.microsoft.com/office/powerpoint/2010/main" xmlns:p15="http://schemas.microsoft.com/office/powerpoint/2012/main" xmlns:ahyp="http://schemas.microsoft.com/office/drawing/2018/hyperlinkcolor" xmlns:go="http://customooxmlschemas.google.com/" r:id="rId28" roundtripDataSignature="AMtx7mgX6AVs8WFfSjUXlCkQJgWuP7ynuA=="/>
+      <go:slidesCustomData xmlns:go="http://customooxmlschemas.google.com/" xmlns:ahyp="http://schemas.microsoft.com/office/drawing/2018/hyperlinkcolor" xmlns:p15="http://schemas.microsoft.com/office/powerpoint/2012/main" xmlns:p14="http://schemas.microsoft.com/office/powerpoint/2010/main" xmlns:com="http://schemas.openxmlformats.org/drawingml/2006/compatibility" xmlns:pvml="urn:schemas-microsoft-com:office:powerpoint" xmlns:v="urn:schemas-microsoft-com:vml" xmlns:o="urn:schemas-microsoft-com:office:office" xmlns:dgm="http://schemas.openxmlformats.org/drawingml/2006/diagram" xmlns:c="http://schemas.openxmlformats.org/drawingml/2006/chart" xmlns:mv="urn:schemas-microsoft-com:mac:vml" xmlns:mc="http://schemas.openxmlformats.org/markup-compatibility/2006" xmlns="" r:id="rId28" roundtripDataSignature="AMtx7mgX6AVs8WFfSjUXlCkQJgWuP7ynuA=="/>
     </p:ext>
   </p:extLst>
 </p:presentation>
@@ -16774,7 +16774,7 @@
               <a:rPr lang="en-US">
                 <a:extLst>
                   <a:ext uri="http://customooxmlschemas.google.com/">
-                    <go:slidesCustomData xmlns="" xmlns:mc="http://schemas.openxmlformats.org/markup-compatibility/2006" xmlns:mv="urn:schemas-microsoft-com:mac:vml" xmlns:c="http://schemas.openxmlformats.org/drawingml/2006/chart" xmlns:dgm="http://schemas.openxmlformats.org/drawingml/2006/diagram" xmlns:o="urn:schemas-microsoft-com:office:office" xmlns:v="urn:schemas-microsoft-com:vml" xmlns:pvml="urn:schemas-microsoft-com:office:powerpoint" xmlns:com="http://schemas.openxmlformats.org/drawingml/2006/compatibility" xmlns:p14="http://schemas.microsoft.com/office/powerpoint/2010/main" xmlns:p15="http://schemas.microsoft.com/office/powerpoint/2012/main" xmlns:ahyp="http://schemas.microsoft.com/office/drawing/2018/hyperlinkcolor" xmlns:go="http://customooxmlschemas.google.com/" textRoundtripDataId="2"/>
+                    <go:slidesCustomData xmlns:go="http://customooxmlschemas.google.com/" xmlns:ahyp="http://schemas.microsoft.com/office/drawing/2018/hyperlinkcolor" xmlns:p15="http://schemas.microsoft.com/office/powerpoint/2012/main" xmlns:p14="http://schemas.microsoft.com/office/powerpoint/2010/main" xmlns:com="http://schemas.openxmlformats.org/drawingml/2006/compatibility" xmlns:pvml="urn:schemas-microsoft-com:office:powerpoint" xmlns:v="urn:schemas-microsoft-com:vml" xmlns:o="urn:schemas-microsoft-com:office:office" xmlns:dgm="http://schemas.openxmlformats.org/drawingml/2006/diagram" xmlns:c="http://schemas.openxmlformats.org/drawingml/2006/chart" xmlns:mv="urn:schemas-microsoft-com:mac:vml" xmlns:mc="http://schemas.openxmlformats.org/markup-compatibility/2006" xmlns="" textRoundtripDataId="2"/>
                   </a:ext>
                 </a:extLst>
               </a:rPr>
@@ -17632,7 +17632,7 @@
           <a:p>
             <a:r>
               <a:rPr lang="en-US" dirty="0"/>
-              <a:t>Quality Measures Track</a:t>
+              <a:t>Clinical Reasoning Track</a:t>
             </a:r>
           </a:p>
         </p:txBody>
@@ -17836,6 +17836,20 @@
             <a:endParaRPr lang="en-US" dirty="0"/>
           </a:p>
           <a:p>
+            <a:pPr lvl="1"/>
+            <a:r>
+              <a:rPr lang="en-US" dirty="0"/>
+              <a:t>Early bird by 8/16</a:t>
+            </a:r>
+          </a:p>
+          <a:p>
+            <a:pPr lvl="1"/>
+            <a:r>
+              <a:rPr lang="en-US" dirty="0"/>
+              <a:t>Deadline by 8/30</a:t>
+            </a:r>
+          </a:p>
+          <a:p>
             <a:r>
               <a:rPr lang="en-US" dirty="0"/>
               <a:t>Reach out to track leads</a:t>
@@ -17844,7 +17858,11 @@
           <a:p>
             <a:r>
               <a:rPr lang="en-US" dirty="0"/>
-              <a:t>Attend track kickoffs</a:t>
+              <a:t>Attend </a:t>
+            </a:r>
+            <a:r>
+              <a:rPr lang="en-US"/>
+              <a:t>track kickoffs</a:t>
             </a:r>
           </a:p>
         </p:txBody>

</xml_diff>